<commit_message>
[2023-12-28] MessageQueue Producer/Consumer 설정 및 구현
</commit_message>
<xml_diff>
--- a/Ajax.pptx
+++ b/Ajax.pptx
@@ -10,6 +10,8 @@
     <p:sldId id="258" r:id="rId4"/>
     <p:sldId id="259" r:id="rId5"/>
     <p:sldId id="260" r:id="rId6"/>
+    <p:sldId id="261" r:id="rId7"/>
+    <p:sldId id="262" r:id="rId8"/>
   </p:sldIdLst>
   <p:sldSz cx="12192000" cy="6858000"/>
   <p:notesSz cx="6858000" cy="9144000"/>
@@ -108,6 +110,11 @@
       </a:defRPr>
     </a:lvl9pPr>
   </p:defaultTextStyle>
+  <p:extLst>
+    <p:ext uri="{EFAFB233-063F-42B5-8137-9DF3F51BA10A}">
+      <p15:sldGuideLst xmlns:p15="http://schemas.microsoft.com/office/powerpoint/2012/main"/>
+    </p:ext>
+  </p:extLst>
 </p:presentation>
 </file>
 
@@ -6925,6 +6932,961 @@
 </p:sld>
 </file>
 
+<file path=ppt/slides/slide6.xml><?xml version="1.0" encoding="utf-8"?>
+<p:sld xmlns:a="http://schemas.openxmlformats.org/drawingml/2006/main" xmlns:r="http://schemas.openxmlformats.org/officeDocument/2006/relationships" xmlns:p="http://schemas.openxmlformats.org/presentationml/2006/main">
+  <p:cSld>
+    <p:spTree>
+      <p:nvGrpSpPr>
+        <p:cNvPr id="1" name=""/>
+        <p:cNvGrpSpPr/>
+        <p:nvPr/>
+      </p:nvGrpSpPr>
+      <p:grpSpPr>
+        <a:xfrm>
+          <a:off x="0" y="0"/>
+          <a:ext cx="0" cy="0"/>
+          <a:chOff x="0" y="0"/>
+          <a:chExt cx="0" cy="0"/>
+        </a:xfrm>
+      </p:grpSpPr>
+      <p:sp>
+        <p:nvSpPr>
+          <p:cNvPr id="4" name="TextBox 3"/>
+          <p:cNvSpPr txBox="1"/>
+          <p:nvPr/>
+        </p:nvSpPr>
+        <p:spPr>
+          <a:xfrm>
+            <a:off x="439615" y="430823"/>
+            <a:ext cx="8830366" cy="646331"/>
+          </a:xfrm>
+          <a:prstGeom prst="rect">
+            <a:avLst/>
+          </a:prstGeom>
+          <a:noFill/>
+        </p:spPr>
+        <p:txBody>
+          <a:bodyPr wrap="none" rtlCol="0">
+            <a:spAutoFit/>
+          </a:bodyPr>
+          <a:lstStyle/>
+          <a:p>
+            <a:r>
+              <a:rPr lang="en-US" altLang="ko-KR" dirty="0" smtClean="0"/>
+              <a:t>AMPQ</a:t>
+            </a:r>
+            <a:r>
+              <a:rPr lang="ko-KR" altLang="en-US" dirty="0" smtClean="0"/>
+              <a:t>를 사용하는 것과 </a:t>
+            </a:r>
+            <a:r>
+              <a:rPr lang="en-US" altLang="ko-KR" dirty="0" smtClean="0"/>
+              <a:t>DB</a:t>
+            </a:r>
+            <a:r>
+              <a:rPr lang="ko-KR" altLang="en-US" dirty="0" smtClean="0"/>
+              <a:t>에서 </a:t>
+            </a:r>
+            <a:r>
+              <a:rPr lang="en-US" altLang="ko-KR" dirty="0" smtClean="0"/>
+              <a:t>Queue </a:t>
+            </a:r>
+            <a:r>
+              <a:rPr lang="ko-KR" altLang="en-US" dirty="0" smtClean="0"/>
+              <a:t>형태로 테이블을 사용하는 것의 차이</a:t>
+            </a:r>
+            <a:r>
+              <a:rPr lang="en-US" altLang="ko-KR" dirty="0" smtClean="0"/>
+              <a:t>(gpt-4)</a:t>
+            </a:r>
+          </a:p>
+          <a:p>
+            <a:endParaRPr lang="ko-KR" altLang="en-US" dirty="0"/>
+          </a:p>
+        </p:txBody>
+      </p:sp>
+      <p:sp>
+        <p:nvSpPr>
+          <p:cNvPr id="5" name="직사각형 4"/>
+          <p:cNvSpPr/>
+          <p:nvPr/>
+        </p:nvSpPr>
+        <p:spPr>
+          <a:xfrm>
+            <a:off x="439615" y="883723"/>
+            <a:ext cx="10711962" cy="5770811"/>
+          </a:xfrm>
+          <a:prstGeom prst="rect">
+            <a:avLst/>
+          </a:prstGeom>
+        </p:spPr>
+        <p:txBody>
+          <a:bodyPr wrap="square">
+            <a:spAutoFit/>
+          </a:bodyPr>
+          <a:lstStyle/>
+          <a:p>
+            <a:r>
+              <a:rPr lang="ko-KR" altLang="en-US" sz="900" dirty="0"/>
+              <a:t>데이터베이스 테이블을 큐처럼 사용하여 선입선출(FIFO) 시스템을 구현하는 것은 가능합니다. 그러나 이 방식과 전문 메시지 큐 시스템(</a:t>
+            </a:r>
+            <a:r>
+              <a:rPr lang="ko-KR" altLang="en-US" sz="900" dirty="0" err="1"/>
+              <a:t>RabbitMQ</a:t>
+            </a:r>
+            <a:r>
+              <a:rPr lang="ko-KR" altLang="en-US" sz="900" dirty="0"/>
+              <a:t> 등)을 사용하는 것 사이에는 중요한 차이점이 몇 가지 있습니다. 여기서는 사용자의 주문을 처리하는 시스템을 예로 들어 설명하겠습니다:</a:t>
+            </a:r>
+          </a:p>
+          <a:p>
+            <a:endParaRPr lang="ko-KR" altLang="en-US" sz="900" dirty="0"/>
+          </a:p>
+          <a:p>
+            <a:r>
+              <a:rPr lang="ko-KR" altLang="en-US" sz="900" dirty="0"/>
+              <a:t>### 1. **동시성과 부하 처리**:</a:t>
+            </a:r>
+          </a:p>
+          <a:p>
+            <a:r>
+              <a:rPr lang="ko-KR" altLang="en-US" sz="900" dirty="0"/>
+              <a:t>- **DB 기반 큐**:</a:t>
+            </a:r>
+          </a:p>
+          <a:p>
+            <a:r>
+              <a:rPr lang="ko-KR" altLang="en-US" sz="900" dirty="0"/>
+              <a:t>  - 데이터베이스는 동시에 많은 트랜잭션을 처리하도록 최적화되어 있지만, 큐와 같은 패턴으로 사용될 때 충돌과 잠금 문제가 발생할 수 있습니다. 여러 가맹점이 동시에 주문을 수령하려 할 때, 동시성 관리가 복잡해지고 성능이 저하될 수 있습니다.</a:t>
+            </a:r>
+          </a:p>
+          <a:p>
+            <a:r>
+              <a:rPr lang="ko-KR" altLang="en-US" sz="900" dirty="0"/>
+              <a:t>  - 데이터베이스에 부하가 집중되어 시스템 전체의 성능 저하로 이어질 수 있습니다.</a:t>
+            </a:r>
+          </a:p>
+          <a:p>
+            <a:endParaRPr lang="ko-KR" altLang="en-US" sz="900" dirty="0"/>
+          </a:p>
+          <a:p>
+            <a:r>
+              <a:rPr lang="ko-KR" altLang="en-US" sz="900" dirty="0"/>
+              <a:t>- **메시지 큐**:</a:t>
+            </a:r>
+          </a:p>
+          <a:p>
+            <a:r>
+              <a:rPr lang="ko-KR" altLang="en-US" sz="900" dirty="0"/>
+              <a:t>  - 메시지 큐 시스템은 동시에 많은 요청을 처리하고, 메시지를 안정적으로 분산시키기 위해 설계되었습니다. 부하 분산과 병렬 처리에 더 효과적입니다.</a:t>
+            </a:r>
+          </a:p>
+          <a:p>
+            <a:r>
+              <a:rPr lang="ko-KR" altLang="en-US" sz="900" dirty="0"/>
+              <a:t>  - 메시지 큐는 메시지를 안전하게 저장하고, 소비자가 준비될 때까지 유지하는 동시에, 여러 소비자가 메시지를 효율적으로 처리할 수 있도록 합니다.</a:t>
+            </a:r>
+          </a:p>
+          <a:p>
+            <a:endParaRPr lang="ko-KR" altLang="en-US" sz="900" dirty="0"/>
+          </a:p>
+          <a:p>
+            <a:r>
+              <a:rPr lang="ko-KR" altLang="en-US" sz="900" dirty="0"/>
+              <a:t>### 2. **신뢰성과 배달 보장**:</a:t>
+            </a:r>
+          </a:p>
+          <a:p>
+            <a:r>
+              <a:rPr lang="ko-KR" altLang="en-US" sz="900" dirty="0"/>
+              <a:t>- **DB 기반 큐**:</a:t>
+            </a:r>
+          </a:p>
+          <a:p>
+            <a:r>
+              <a:rPr lang="ko-KR" altLang="en-US" sz="900" dirty="0"/>
+              <a:t>  - 주문이 처리 중에 시스템에 장애가 발생하면, 주문이 영구적으로 손실되거나 중복 처리될 수 있습니다. 이를 관리하기 위한 추가적인 </a:t>
+            </a:r>
+            <a:r>
+              <a:rPr lang="ko-KR" altLang="en-US" sz="900" dirty="0" err="1"/>
+              <a:t>로직이</a:t>
+            </a:r>
+            <a:r>
+              <a:rPr lang="ko-KR" altLang="en-US" sz="900" dirty="0"/>
+              <a:t> 필요합니다.</a:t>
+            </a:r>
+          </a:p>
+          <a:p>
+            <a:r>
+              <a:rPr lang="ko-KR" altLang="en-US" sz="900" dirty="0"/>
+              <a:t>  - 주문의 상태를 추적하고, 실패한 작업을 재시도하는 등의 처리가 복잡해질 수 있습니다.</a:t>
+            </a:r>
+          </a:p>
+          <a:p>
+            <a:endParaRPr lang="ko-KR" altLang="en-US" sz="900" dirty="0"/>
+          </a:p>
+          <a:p>
+            <a:r>
+              <a:rPr lang="ko-KR" altLang="en-US" sz="900" dirty="0"/>
+              <a:t>- **메시지 큐**:</a:t>
+            </a:r>
+          </a:p>
+          <a:p>
+            <a:r>
+              <a:rPr lang="ko-KR" altLang="en-US" sz="900" dirty="0"/>
+              <a:t>  - 메시지 큐는 메시지가 소비되기 전에는 큐에서 제거되지 않으므로, 시스템 장애가 발생해도 메시지를 잃어버리지 않습니다.</a:t>
+            </a:r>
+          </a:p>
+          <a:p>
+            <a:r>
+              <a:rPr lang="ko-KR" altLang="en-US" sz="900" dirty="0"/>
+              <a:t>  - 메시지를 처리하고 확인하는 기능, 실패한 메시지를 다시 시도하거나, 사고 발생 시 메시지를 다른 큐로 이동시키는 등의 고급 기능을 제공합니다.</a:t>
+            </a:r>
+          </a:p>
+          <a:p>
+            <a:endParaRPr lang="ko-KR" altLang="en-US" sz="900" dirty="0"/>
+          </a:p>
+          <a:p>
+            <a:r>
+              <a:rPr lang="ko-KR" altLang="en-US" sz="900" dirty="0"/>
+              <a:t>### 3. **확장성과 유지보수**:</a:t>
+            </a:r>
+          </a:p>
+          <a:p>
+            <a:r>
+              <a:rPr lang="ko-KR" altLang="en-US" sz="900" dirty="0"/>
+              <a:t>- **DB 기반 큐**:</a:t>
+            </a:r>
+          </a:p>
+          <a:p>
+            <a:r>
+              <a:rPr lang="ko-KR" altLang="en-US" sz="900" dirty="0"/>
+              <a:t>  - 확장성은 데이터베이스의 성능과 구조에 크게 의존합니다. 큰 트래픽을 처리하기 위해서는 데이터베이스 스케일링이 필요하며, 이는 복잡하고 비용이 많이 들 수 있습니다.</a:t>
+            </a:r>
+          </a:p>
+          <a:p>
+            <a:r>
+              <a:rPr lang="ko-KR" altLang="en-US" sz="900" dirty="0"/>
+              <a:t>  - 큐 </a:t>
+            </a:r>
+            <a:r>
+              <a:rPr lang="ko-KR" altLang="en-US" sz="900" dirty="0" err="1"/>
+              <a:t>로직을</a:t>
+            </a:r>
+            <a:r>
+              <a:rPr lang="ko-KR" altLang="en-US" sz="900" dirty="0"/>
+              <a:t> 애플리케이션 코드 내에 구현해야 하므로, 유지보수가 더 복잡해질 수 있습니다.</a:t>
+            </a:r>
+          </a:p>
+          <a:p>
+            <a:endParaRPr lang="ko-KR" altLang="en-US" sz="900" dirty="0"/>
+          </a:p>
+          <a:p>
+            <a:r>
+              <a:rPr lang="ko-KR" altLang="en-US" sz="900" dirty="0"/>
+              <a:t>- **메시지 큐**:</a:t>
+            </a:r>
+          </a:p>
+          <a:p>
+            <a:r>
+              <a:rPr lang="ko-KR" altLang="en-US" sz="900" dirty="0"/>
+              <a:t>  - 메시지 큐는 수평적 확장이 용이하며, 클러스터링이나 여러 노드를 통한 부하 분산이 자연스럽게 지원됩니다.</a:t>
+            </a:r>
+          </a:p>
+          <a:p>
+            <a:r>
+              <a:rPr lang="ko-KR" altLang="en-US" sz="900" dirty="0"/>
+              <a:t>  - 시스템 간의 </a:t>
+            </a:r>
+            <a:r>
+              <a:rPr lang="ko-KR" altLang="en-US" sz="900" dirty="0" err="1"/>
+              <a:t>결합도를</a:t>
+            </a:r>
+            <a:r>
+              <a:rPr lang="ko-KR" altLang="en-US" sz="900" dirty="0"/>
+              <a:t> 낮추고, 각 시스템이나 서비스가 자신의 역할에만 집중할 수 있도록 하여 유지보수를 단순화합니다.</a:t>
+            </a:r>
+          </a:p>
+          <a:p>
+            <a:endParaRPr lang="ko-KR" altLang="en-US" sz="900" dirty="0"/>
+          </a:p>
+          <a:p>
+            <a:r>
+              <a:rPr lang="ko-KR" altLang="en-US" sz="900" dirty="0"/>
+              <a:t>### 4. **복잡성과 전문성**:</a:t>
+            </a:r>
+          </a:p>
+          <a:p>
+            <a:r>
+              <a:rPr lang="ko-KR" altLang="en-US" sz="900" dirty="0"/>
+              <a:t>- **DB 기반 큐**:</a:t>
+            </a:r>
+          </a:p>
+          <a:p>
+            <a:r>
+              <a:rPr lang="ko-KR" altLang="en-US" sz="900" dirty="0"/>
+              <a:t>  - 데이터베이스를 사용하면, 개발자들이 이미 익숙한 기술을 활용할 수 있어 초기 진입 장벽이 낮을 수 있습니다.</a:t>
+            </a:r>
+          </a:p>
+          <a:p>
+            <a:r>
+              <a:rPr lang="ko-KR" altLang="en-US" sz="900" dirty="0"/>
+              <a:t>  - 그러나 큐 시스템으로 사용될 때 발생할 수 있는 여러 문제를 해결하기 위해 복잡한 </a:t>
+            </a:r>
+            <a:r>
+              <a:rPr lang="ko-KR" altLang="en-US" sz="900" dirty="0" err="1"/>
+              <a:t>로직과</a:t>
+            </a:r>
+            <a:r>
+              <a:rPr lang="ko-KR" altLang="en-US" sz="900" dirty="0"/>
+              <a:t> 조정이 필요합니다.</a:t>
+            </a:r>
+          </a:p>
+          <a:p>
+            <a:endParaRPr lang="ko-KR" altLang="en-US" sz="900" dirty="0"/>
+          </a:p>
+          <a:p>
+            <a:r>
+              <a:rPr lang="ko-KR" altLang="en-US" sz="900" dirty="0"/>
+              <a:t>- **메시지 큐**:</a:t>
+            </a:r>
+          </a:p>
+          <a:p>
+            <a:r>
+              <a:rPr lang="ko-KR" altLang="en-US" sz="900" dirty="0"/>
+              <a:t>  - 메시지 큐는 별도의 학습과 이해가 필요하지만, 일단 익숙해지면 훨씬 강력하고 안정적인 메시지 전달 시스템을 구축할 수 있습니다.</a:t>
+            </a:r>
+          </a:p>
+          <a:p>
+            <a:endParaRPr lang="ko-KR" altLang="en-US" sz="900" dirty="0"/>
+          </a:p>
+          <a:p>
+            <a:r>
+              <a:rPr lang="ko-KR" altLang="en-US" sz="900" dirty="0"/>
+              <a:t>결론적으로, 데이터베이스 테이블을 큐처럼 사용하는 것은 간단한 시나리오에서는 작동할 수 있지만, 확장성, 신뢰성, 복잡성 관리 등 여러 면에서 전문 메시지 큐 시스템이 더 많은 이점을 제공합니다. 시스템의 요구사항, 트래픽 양, 개발 및 유지보수 리소스 등을 고려하여 적절한 도구를 선택하는 것이 중요합니다.</a:t>
+            </a:r>
+          </a:p>
+        </p:txBody>
+      </p:sp>
+    </p:spTree>
+    <p:extLst>
+      <p:ext uri="{BB962C8B-B14F-4D97-AF65-F5344CB8AC3E}">
+        <p14:creationId xmlns:p14="http://schemas.microsoft.com/office/powerpoint/2010/main" val="815656897"/>
+      </p:ext>
+    </p:extLst>
+  </p:cSld>
+  <p:clrMapOvr>
+    <a:masterClrMapping/>
+  </p:clrMapOvr>
+</p:sld>
+</file>
+
+<file path=ppt/slides/slide7.xml><?xml version="1.0" encoding="utf-8"?>
+<p:sld xmlns:a="http://schemas.openxmlformats.org/drawingml/2006/main" xmlns:r="http://schemas.openxmlformats.org/officeDocument/2006/relationships" xmlns:p="http://schemas.openxmlformats.org/presentationml/2006/main">
+  <p:cSld>
+    <p:spTree>
+      <p:nvGrpSpPr>
+        <p:cNvPr id="1" name=""/>
+        <p:cNvGrpSpPr/>
+        <p:nvPr/>
+      </p:nvGrpSpPr>
+      <p:grpSpPr>
+        <a:xfrm>
+          <a:off x="0" y="0"/>
+          <a:ext cx="0" cy="0"/>
+          <a:chOff x="0" y="0"/>
+          <a:chExt cx="0" cy="0"/>
+        </a:xfrm>
+      </p:grpSpPr>
+      <p:grpSp>
+        <p:nvGrpSpPr>
+          <p:cNvPr id="15" name="그룹 14"/>
+          <p:cNvGrpSpPr/>
+          <p:nvPr/>
+        </p:nvGrpSpPr>
+        <p:grpSpPr>
+          <a:xfrm>
+            <a:off x="1387053" y="2523392"/>
+            <a:ext cx="6421315" cy="931985"/>
+            <a:chOff x="1840523" y="1872761"/>
+            <a:chExt cx="6421315" cy="931985"/>
+          </a:xfrm>
+        </p:grpSpPr>
+        <p:sp>
+          <p:nvSpPr>
+            <p:cNvPr id="4" name="직사각형 3"/>
+            <p:cNvSpPr/>
+            <p:nvPr/>
+          </p:nvSpPr>
+          <p:spPr>
+            <a:xfrm>
+              <a:off x="4466492" y="1872761"/>
+              <a:ext cx="1169377" cy="931985"/>
+            </a:xfrm>
+            <a:prstGeom prst="rect">
+              <a:avLst/>
+            </a:prstGeom>
+          </p:spPr>
+          <p:style>
+            <a:lnRef idx="2">
+              <a:schemeClr val="accent1">
+                <a:shade val="50000"/>
+              </a:schemeClr>
+            </a:lnRef>
+            <a:fillRef idx="1">
+              <a:schemeClr val="accent1"/>
+            </a:fillRef>
+            <a:effectRef idx="0">
+              <a:schemeClr val="accent1"/>
+            </a:effectRef>
+            <a:fontRef idx="minor">
+              <a:schemeClr val="lt1"/>
+            </a:fontRef>
+          </p:style>
+          <p:txBody>
+            <a:bodyPr rtlCol="0" anchor="ctr"/>
+            <a:lstStyle/>
+            <a:p>
+              <a:pPr algn="ctr"/>
+              <a:r>
+                <a:rPr lang="en-US" altLang="ko-KR" dirty="0" smtClean="0"/>
+                <a:t>MQ</a:t>
+              </a:r>
+              <a:endParaRPr lang="ko-KR" altLang="en-US" dirty="0"/>
+            </a:p>
+          </p:txBody>
+        </p:sp>
+        <p:sp>
+          <p:nvSpPr>
+            <p:cNvPr id="6" name="직사각형 5"/>
+            <p:cNvSpPr/>
+            <p:nvPr/>
+          </p:nvSpPr>
+          <p:spPr>
+            <a:xfrm>
+              <a:off x="1840523" y="1872761"/>
+              <a:ext cx="1169377" cy="931985"/>
+            </a:xfrm>
+            <a:prstGeom prst="rect">
+              <a:avLst/>
+            </a:prstGeom>
+          </p:spPr>
+          <p:style>
+            <a:lnRef idx="2">
+              <a:schemeClr val="accent1">
+                <a:shade val="50000"/>
+              </a:schemeClr>
+            </a:lnRef>
+            <a:fillRef idx="1">
+              <a:schemeClr val="accent1"/>
+            </a:fillRef>
+            <a:effectRef idx="0">
+              <a:schemeClr val="accent1"/>
+            </a:effectRef>
+            <a:fontRef idx="minor">
+              <a:schemeClr val="lt1"/>
+            </a:fontRef>
+          </p:style>
+          <p:txBody>
+            <a:bodyPr rtlCol="0" anchor="ctr"/>
+            <a:lstStyle/>
+            <a:p>
+              <a:pPr algn="ctr"/>
+              <a:r>
+                <a:rPr lang="en-US" altLang="ko-KR" dirty="0" smtClean="0"/>
+                <a:t>P</a:t>
+              </a:r>
+              <a:endParaRPr lang="ko-KR" altLang="en-US" dirty="0"/>
+            </a:p>
+          </p:txBody>
+        </p:sp>
+        <p:sp>
+          <p:nvSpPr>
+            <p:cNvPr id="7" name="직사각형 6"/>
+            <p:cNvSpPr/>
+            <p:nvPr/>
+          </p:nvSpPr>
+          <p:spPr>
+            <a:xfrm>
+              <a:off x="7092461" y="1872761"/>
+              <a:ext cx="1169377" cy="931985"/>
+            </a:xfrm>
+            <a:prstGeom prst="rect">
+              <a:avLst/>
+            </a:prstGeom>
+          </p:spPr>
+          <p:style>
+            <a:lnRef idx="2">
+              <a:schemeClr val="accent1">
+                <a:shade val="50000"/>
+              </a:schemeClr>
+            </a:lnRef>
+            <a:fillRef idx="1">
+              <a:schemeClr val="accent1"/>
+            </a:fillRef>
+            <a:effectRef idx="0">
+              <a:schemeClr val="accent1"/>
+            </a:effectRef>
+            <a:fontRef idx="minor">
+              <a:schemeClr val="lt1"/>
+            </a:fontRef>
+          </p:style>
+          <p:txBody>
+            <a:bodyPr rtlCol="0" anchor="ctr"/>
+            <a:lstStyle/>
+            <a:p>
+              <a:pPr algn="ctr"/>
+              <a:r>
+                <a:rPr lang="en-US" altLang="ko-KR" dirty="0" smtClean="0"/>
+                <a:t>C</a:t>
+              </a:r>
+              <a:endParaRPr lang="ko-KR" altLang="en-US" dirty="0"/>
+            </a:p>
+          </p:txBody>
+        </p:sp>
+        <p:sp>
+          <p:nvSpPr>
+            <p:cNvPr id="8" name="직사각형 7"/>
+            <p:cNvSpPr/>
+            <p:nvPr/>
+          </p:nvSpPr>
+          <p:spPr>
+            <a:xfrm>
+              <a:off x="4466492" y="2382714"/>
+              <a:ext cx="618392" cy="422032"/>
+            </a:xfrm>
+            <a:prstGeom prst="rect">
+              <a:avLst/>
+            </a:prstGeom>
+            <a:solidFill>
+              <a:srgbClr val="FFFF00"/>
+            </a:solidFill>
+          </p:spPr>
+          <p:style>
+            <a:lnRef idx="2">
+              <a:schemeClr val="accent1">
+                <a:shade val="50000"/>
+              </a:schemeClr>
+            </a:lnRef>
+            <a:fillRef idx="1">
+              <a:schemeClr val="accent1"/>
+            </a:fillRef>
+            <a:effectRef idx="0">
+              <a:schemeClr val="accent1"/>
+            </a:effectRef>
+            <a:fontRef idx="minor">
+              <a:schemeClr val="lt1"/>
+            </a:fontRef>
+          </p:style>
+          <p:txBody>
+            <a:bodyPr rtlCol="0" anchor="ctr"/>
+            <a:lstStyle/>
+            <a:p>
+              <a:pPr algn="ctr"/>
+              <a:r>
+                <a:rPr lang="en-US" altLang="ko-KR" sz="600" dirty="0" smtClean="0">
+                  <a:solidFill>
+                    <a:schemeClr val="tx1"/>
+                  </a:solidFill>
+                </a:rPr>
+                <a:t>Message2</a:t>
+              </a:r>
+              <a:endParaRPr lang="ko-KR" altLang="en-US" sz="600" dirty="0">
+                <a:solidFill>
+                  <a:schemeClr val="tx1"/>
+                </a:solidFill>
+              </a:endParaRPr>
+            </a:p>
+          </p:txBody>
+        </p:sp>
+        <p:sp>
+          <p:nvSpPr>
+            <p:cNvPr id="9" name="직사각형 8"/>
+            <p:cNvSpPr/>
+            <p:nvPr/>
+          </p:nvSpPr>
+          <p:spPr>
+            <a:xfrm>
+              <a:off x="6605953" y="2171698"/>
+              <a:ext cx="618392" cy="422032"/>
+            </a:xfrm>
+            <a:prstGeom prst="rect">
+              <a:avLst/>
+            </a:prstGeom>
+            <a:solidFill>
+              <a:srgbClr val="FFFF00"/>
+            </a:solidFill>
+          </p:spPr>
+          <p:style>
+            <a:lnRef idx="2">
+              <a:schemeClr val="accent1">
+                <a:shade val="50000"/>
+              </a:schemeClr>
+            </a:lnRef>
+            <a:fillRef idx="1">
+              <a:schemeClr val="accent1"/>
+            </a:fillRef>
+            <a:effectRef idx="0">
+              <a:schemeClr val="accent1"/>
+            </a:effectRef>
+            <a:fontRef idx="minor">
+              <a:schemeClr val="lt1"/>
+            </a:fontRef>
+          </p:style>
+          <p:txBody>
+            <a:bodyPr rtlCol="0" anchor="ctr"/>
+            <a:lstStyle/>
+            <a:p>
+              <a:pPr algn="ctr"/>
+              <a:r>
+                <a:rPr lang="en-US" altLang="ko-KR" sz="600" dirty="0" smtClean="0">
+                  <a:solidFill>
+                    <a:schemeClr val="tx1"/>
+                  </a:solidFill>
+                </a:rPr>
+                <a:t>Message0</a:t>
+              </a:r>
+              <a:endParaRPr lang="ko-KR" altLang="en-US" sz="600" dirty="0">
+                <a:solidFill>
+                  <a:schemeClr val="tx1"/>
+                </a:solidFill>
+              </a:endParaRPr>
+            </a:p>
+          </p:txBody>
+        </p:sp>
+        <p:sp>
+          <p:nvSpPr>
+            <p:cNvPr id="10" name="직사각형 9"/>
+            <p:cNvSpPr/>
+            <p:nvPr/>
+          </p:nvSpPr>
+          <p:spPr>
+            <a:xfrm>
+              <a:off x="2667001" y="2136527"/>
+              <a:ext cx="618392" cy="422032"/>
+            </a:xfrm>
+            <a:prstGeom prst="rect">
+              <a:avLst/>
+            </a:prstGeom>
+            <a:solidFill>
+              <a:srgbClr val="FFFF00"/>
+            </a:solidFill>
+          </p:spPr>
+          <p:style>
+            <a:lnRef idx="2">
+              <a:schemeClr val="accent1">
+                <a:shade val="50000"/>
+              </a:schemeClr>
+            </a:lnRef>
+            <a:fillRef idx="1">
+              <a:schemeClr val="accent1"/>
+            </a:fillRef>
+            <a:effectRef idx="0">
+              <a:schemeClr val="accent1"/>
+            </a:effectRef>
+            <a:fontRef idx="minor">
+              <a:schemeClr val="lt1"/>
+            </a:fontRef>
+          </p:style>
+          <p:txBody>
+            <a:bodyPr rtlCol="0" anchor="ctr"/>
+            <a:lstStyle/>
+            <a:p>
+              <a:pPr algn="ctr"/>
+              <a:r>
+                <a:rPr lang="en-US" altLang="ko-KR" sz="600" dirty="0" smtClean="0">
+                  <a:solidFill>
+                    <a:schemeClr val="tx1"/>
+                  </a:solidFill>
+                </a:rPr>
+                <a:t>Message3</a:t>
+              </a:r>
+              <a:endParaRPr lang="ko-KR" altLang="en-US" sz="600" dirty="0">
+                <a:solidFill>
+                  <a:schemeClr val="tx1"/>
+                </a:solidFill>
+              </a:endParaRPr>
+            </a:p>
+          </p:txBody>
+        </p:sp>
+        <p:sp>
+          <p:nvSpPr>
+            <p:cNvPr id="11" name="직사각형 10"/>
+            <p:cNvSpPr/>
+            <p:nvPr/>
+          </p:nvSpPr>
+          <p:spPr>
+            <a:xfrm>
+              <a:off x="5051180" y="2382714"/>
+              <a:ext cx="618392" cy="422032"/>
+            </a:xfrm>
+            <a:prstGeom prst="rect">
+              <a:avLst/>
+            </a:prstGeom>
+            <a:solidFill>
+              <a:srgbClr val="FFFF00"/>
+            </a:solidFill>
+          </p:spPr>
+          <p:style>
+            <a:lnRef idx="2">
+              <a:schemeClr val="accent1">
+                <a:shade val="50000"/>
+              </a:schemeClr>
+            </a:lnRef>
+            <a:fillRef idx="1">
+              <a:schemeClr val="accent1"/>
+            </a:fillRef>
+            <a:effectRef idx="0">
+              <a:schemeClr val="accent1"/>
+            </a:effectRef>
+            <a:fontRef idx="minor">
+              <a:schemeClr val="lt1"/>
+            </a:fontRef>
+          </p:style>
+          <p:txBody>
+            <a:bodyPr rtlCol="0" anchor="ctr"/>
+            <a:lstStyle/>
+            <a:p>
+              <a:pPr algn="ctr"/>
+              <a:r>
+                <a:rPr lang="en-US" altLang="ko-KR" sz="600" dirty="0" smtClean="0">
+                  <a:solidFill>
+                    <a:schemeClr val="tx1"/>
+                  </a:solidFill>
+                </a:rPr>
+                <a:t>Message1</a:t>
+              </a:r>
+              <a:endParaRPr lang="ko-KR" altLang="en-US" sz="600" dirty="0">
+                <a:solidFill>
+                  <a:schemeClr val="tx1"/>
+                </a:solidFill>
+              </a:endParaRPr>
+            </a:p>
+          </p:txBody>
+        </p:sp>
+      </p:grpSp>
+      <p:sp>
+        <p:nvSpPr>
+          <p:cNvPr id="12" name="TextBox 11"/>
+          <p:cNvSpPr txBox="1"/>
+          <p:nvPr/>
+        </p:nvSpPr>
+        <p:spPr>
+          <a:xfrm>
+            <a:off x="1387053" y="3543294"/>
+            <a:ext cx="7850162" cy="646331"/>
+          </a:xfrm>
+          <a:prstGeom prst="rect">
+            <a:avLst/>
+          </a:prstGeom>
+          <a:noFill/>
+        </p:spPr>
+        <p:txBody>
+          <a:bodyPr wrap="none" rtlCol="0">
+            <a:spAutoFit/>
+          </a:bodyPr>
+          <a:lstStyle/>
+          <a:p>
+            <a:r>
+              <a:rPr lang="en-US" altLang="ko-KR" dirty="0" smtClean="0"/>
+              <a:t>Message</a:t>
+            </a:r>
+            <a:r>
+              <a:rPr lang="ko-KR" altLang="en-US" dirty="0" smtClean="0"/>
+              <a:t>의 규격을 정해서 전달</a:t>
+            </a:r>
+            <a:endParaRPr lang="en-US" altLang="ko-KR" dirty="0" smtClean="0"/>
+          </a:p>
+          <a:p>
+            <a:r>
+              <a:rPr lang="ko-KR" altLang="en-US" dirty="0" smtClean="0"/>
+              <a:t>객체 </a:t>
+            </a:r>
+            <a:r>
+              <a:rPr lang="en-US" altLang="ko-KR" dirty="0" smtClean="0"/>
+              <a:t>-&gt; JSON -&gt; </a:t>
+            </a:r>
+            <a:r>
+              <a:rPr lang="ko-KR" altLang="en-US" dirty="0" smtClean="0"/>
+              <a:t>객체 </a:t>
+            </a:r>
+            <a:r>
+              <a:rPr lang="en-US" altLang="ko-KR" dirty="0" smtClean="0"/>
+              <a:t>[</a:t>
+            </a:r>
+            <a:r>
+              <a:rPr lang="en-US" altLang="ko-KR" dirty="0" err="1" smtClean="0"/>
+              <a:t>ObjectMapper</a:t>
+            </a:r>
+            <a:r>
+              <a:rPr lang="ko-KR" altLang="en-US" dirty="0" smtClean="0"/>
+              <a:t>를 인자로 받는 </a:t>
+            </a:r>
+            <a:r>
+              <a:rPr lang="en-US" altLang="ko-KR" dirty="0" smtClean="0"/>
+              <a:t>Jackson2 Bean </a:t>
+            </a:r>
+            <a:r>
+              <a:rPr lang="ko-KR" altLang="en-US" dirty="0" smtClean="0"/>
+              <a:t>설정</a:t>
+            </a:r>
+            <a:r>
+              <a:rPr lang="en-US" altLang="ko-KR" dirty="0" smtClean="0"/>
+              <a:t>]</a:t>
+            </a:r>
+            <a:endParaRPr lang="ko-KR" altLang="en-US" dirty="0"/>
+          </a:p>
+        </p:txBody>
+      </p:sp>
+      <p:sp>
+        <p:nvSpPr>
+          <p:cNvPr id="13" name="TextBox 12"/>
+          <p:cNvSpPr txBox="1"/>
+          <p:nvPr/>
+        </p:nvSpPr>
+        <p:spPr>
+          <a:xfrm>
+            <a:off x="495986" y="1670324"/>
+            <a:ext cx="4053482" cy="738664"/>
+          </a:xfrm>
+          <a:prstGeom prst="rect">
+            <a:avLst/>
+          </a:prstGeom>
+          <a:noFill/>
+        </p:spPr>
+        <p:txBody>
+          <a:bodyPr wrap="none" rtlCol="0">
+            <a:spAutoFit/>
+          </a:bodyPr>
+          <a:lstStyle/>
+          <a:p>
+            <a:r>
+              <a:rPr lang="ko-KR" altLang="en-US" sz="1400" dirty="0" smtClean="0"/>
+              <a:t>어디로 보낼 것인가</a:t>
+            </a:r>
+            <a:r>
+              <a:rPr lang="en-US" altLang="ko-KR" sz="1400" dirty="0" smtClean="0"/>
+              <a:t>? Exchange &amp; Queue [ Key ]</a:t>
+            </a:r>
+          </a:p>
+          <a:p>
+            <a:r>
+              <a:rPr lang="ko-KR" altLang="en-US" sz="1400" dirty="0" smtClean="0"/>
+              <a:t>무엇을 보낼 것인가</a:t>
+            </a:r>
+            <a:r>
+              <a:rPr lang="en-US" altLang="ko-KR" sz="1400" dirty="0" smtClean="0"/>
+              <a:t>? Object</a:t>
+            </a:r>
+          </a:p>
+          <a:p>
+            <a:r>
+              <a:rPr lang="ko-KR" altLang="en-US" sz="1400" dirty="0" smtClean="0"/>
+              <a:t>어떻게 보낼 것인가</a:t>
+            </a:r>
+            <a:r>
+              <a:rPr lang="en-US" altLang="ko-KR" sz="1400" dirty="0" smtClean="0"/>
+              <a:t>? </a:t>
+            </a:r>
+            <a:r>
+              <a:rPr lang="en-US" altLang="ko-KR" sz="1400" dirty="0" err="1" smtClean="0"/>
+              <a:t>RabbitTemplate</a:t>
+            </a:r>
+            <a:endParaRPr lang="ko-KR" altLang="en-US" sz="1400" dirty="0"/>
+          </a:p>
+        </p:txBody>
+      </p:sp>
+      <p:sp>
+        <p:nvSpPr>
+          <p:cNvPr id="14" name="TextBox 13"/>
+          <p:cNvSpPr txBox="1"/>
+          <p:nvPr/>
+        </p:nvSpPr>
+        <p:spPr>
+          <a:xfrm>
+            <a:off x="5904033" y="1670324"/>
+            <a:ext cx="4695324" cy="738664"/>
+          </a:xfrm>
+          <a:prstGeom prst="rect">
+            <a:avLst/>
+          </a:prstGeom>
+          <a:noFill/>
+        </p:spPr>
+        <p:txBody>
+          <a:bodyPr wrap="none" rtlCol="0">
+            <a:spAutoFit/>
+          </a:bodyPr>
+          <a:lstStyle/>
+          <a:p>
+            <a:r>
+              <a:rPr lang="ko-KR" altLang="en-US" sz="1400" dirty="0" smtClean="0"/>
+              <a:t>어디서 받을 것인가</a:t>
+            </a:r>
+            <a:r>
+              <a:rPr lang="en-US" altLang="ko-KR" sz="1400" dirty="0" smtClean="0"/>
+              <a:t>? @</a:t>
+            </a:r>
+            <a:r>
+              <a:rPr lang="en-US" altLang="ko-KR" sz="1400" dirty="0" err="1" smtClean="0"/>
+              <a:t>RabbitListener</a:t>
+            </a:r>
+            <a:r>
+              <a:rPr lang="en-US" altLang="ko-KR" sz="1400" dirty="0" smtClean="0"/>
+              <a:t>(queues=“…”)</a:t>
+            </a:r>
+          </a:p>
+          <a:p>
+            <a:r>
+              <a:rPr lang="ko-KR" altLang="en-US" sz="1400" dirty="0" smtClean="0"/>
+              <a:t>무엇을 받을 것인가</a:t>
+            </a:r>
+            <a:r>
+              <a:rPr lang="en-US" altLang="ko-KR" sz="1400" dirty="0" smtClean="0"/>
+              <a:t>? Object</a:t>
+            </a:r>
+          </a:p>
+          <a:p>
+            <a:r>
+              <a:rPr lang="ko-KR" altLang="en-US" sz="1400" dirty="0" smtClean="0"/>
+              <a:t>어떻게 받을 것인가</a:t>
+            </a:r>
+            <a:r>
+              <a:rPr lang="en-US" altLang="ko-KR" sz="1400" dirty="0" smtClean="0"/>
+              <a:t>? </a:t>
+            </a:r>
+            <a:r>
+              <a:rPr lang="en-US" altLang="ko-KR" sz="1400" dirty="0" err="1" smtClean="0"/>
+              <a:t>MessageConvertor</a:t>
+            </a:r>
+            <a:r>
+              <a:rPr lang="en-US" altLang="ko-KR" sz="1400" dirty="0" smtClean="0"/>
+              <a:t>(</a:t>
+            </a:r>
+            <a:r>
+              <a:rPr lang="en-US" altLang="ko-KR" sz="1400" dirty="0" err="1" smtClean="0"/>
+              <a:t>ObjectMapper</a:t>
+            </a:r>
+            <a:r>
+              <a:rPr lang="en-US" altLang="ko-KR" sz="1400" dirty="0" smtClean="0"/>
+              <a:t>)</a:t>
+            </a:r>
+            <a:endParaRPr lang="ko-KR" altLang="en-US" sz="1400" dirty="0"/>
+          </a:p>
+        </p:txBody>
+      </p:sp>
+    </p:spTree>
+    <p:extLst>
+      <p:ext uri="{BB962C8B-B14F-4D97-AF65-F5344CB8AC3E}">
+        <p14:creationId xmlns:p14="http://schemas.microsoft.com/office/powerpoint/2010/main" val="1150332756"/>
+      </p:ext>
+    </p:extLst>
+  </p:cSld>
+  <p:clrMapOvr>
+    <a:masterClrMapping/>
+  </p:clrMapOvr>
+</p:sld>
+</file>
+
 <file path=ppt/theme/theme1.xml><?xml version="1.0" encoding="utf-8"?>
 <a:theme xmlns:a="http://schemas.openxmlformats.org/drawingml/2006/main" name="Office 테마">
   <a:themeElements>

</xml_diff>

<commit_message>
[2023-12-29] 가맹점 push 알림 구현
</commit_message>
<xml_diff>
--- a/Ajax.pptx
+++ b/Ajax.pptx
@@ -12,6 +12,8 @@
     <p:sldId id="260" r:id="rId6"/>
     <p:sldId id="261" r:id="rId7"/>
     <p:sldId id="262" r:id="rId8"/>
+    <p:sldId id="263" r:id="rId9"/>
+    <p:sldId id="264" r:id="rId10"/>
   </p:sldIdLst>
   <p:sldSz cx="12192000" cy="6858000"/>
   <p:notesSz cx="6858000" cy="9144000"/>
@@ -7887,6 +7889,1386 @@
 </p:sld>
 </file>
 
+<file path=ppt/slides/slide8.xml><?xml version="1.0" encoding="utf-8"?>
+<p:sld xmlns:a="http://schemas.openxmlformats.org/drawingml/2006/main" xmlns:r="http://schemas.openxmlformats.org/officeDocument/2006/relationships" xmlns:p="http://schemas.openxmlformats.org/presentationml/2006/main">
+  <p:cSld>
+    <p:spTree>
+      <p:nvGrpSpPr>
+        <p:cNvPr id="1" name=""/>
+        <p:cNvGrpSpPr/>
+        <p:nvPr/>
+      </p:nvGrpSpPr>
+      <p:grpSpPr>
+        <a:xfrm>
+          <a:off x="0" y="0"/>
+          <a:ext cx="0" cy="0"/>
+          <a:chOff x="0" y="0"/>
+          <a:chExt cx="0" cy="0"/>
+        </a:xfrm>
+      </p:grpSpPr>
+      <p:sp>
+        <p:nvSpPr>
+          <p:cNvPr id="2" name="제목 1"/>
+          <p:cNvSpPr>
+            <a:spLocks noGrp="1"/>
+          </p:cNvSpPr>
+          <p:nvPr>
+            <p:ph type="title"/>
+          </p:nvPr>
+        </p:nvSpPr>
+        <p:spPr/>
+        <p:txBody>
+          <a:bodyPr/>
+          <a:lstStyle/>
+          <a:p>
+            <a:r>
+              <a:rPr lang="en-US" altLang="ko-KR" dirty="0" smtClean="0"/>
+              <a:t>SSE(Server-Sent-Event)</a:t>
+            </a:r>
+            <a:endParaRPr lang="ko-KR" altLang="en-US" dirty="0"/>
+          </a:p>
+        </p:txBody>
+      </p:sp>
+      <p:sp>
+        <p:nvSpPr>
+          <p:cNvPr id="4" name="TextBox 3"/>
+          <p:cNvSpPr txBox="1"/>
+          <p:nvPr/>
+        </p:nvSpPr>
+        <p:spPr>
+          <a:xfrm>
+            <a:off x="151297" y="1600154"/>
+            <a:ext cx="11945899" cy="2031325"/>
+          </a:xfrm>
+          <a:prstGeom prst="rect">
+            <a:avLst/>
+          </a:prstGeom>
+          <a:noFill/>
+        </p:spPr>
+        <p:txBody>
+          <a:bodyPr wrap="none" rtlCol="0">
+            <a:spAutoFit/>
+          </a:bodyPr>
+          <a:lstStyle/>
+          <a:p>
+            <a:r>
+              <a:rPr lang="ko-KR" altLang="en-US" sz="1400" dirty="0" err="1" smtClean="0"/>
+              <a:t>단방향</a:t>
+            </a:r>
+            <a:r>
+              <a:rPr lang="ko-KR" altLang="en-US" sz="1400" dirty="0" smtClean="0"/>
+              <a:t> 통신을 통해 서버에서 클라이언트로 실시간 이벤트를 전송하는 웹 기술</a:t>
+            </a:r>
+            <a:endParaRPr lang="en-US" altLang="ko-KR" sz="1400" dirty="0" smtClean="0"/>
+          </a:p>
+          <a:p>
+            <a:r>
+              <a:rPr lang="ko-KR" altLang="en-US" sz="1400" dirty="0" err="1" smtClean="0"/>
+              <a:t>이를통해</a:t>
+            </a:r>
+            <a:r>
+              <a:rPr lang="ko-KR" altLang="en-US" sz="1400" dirty="0" smtClean="0"/>
+              <a:t> 서버 측에서 이벤트를 생성하고</a:t>
+            </a:r>
+            <a:r>
+              <a:rPr lang="en-US" altLang="ko-KR" sz="1400" dirty="0" smtClean="0"/>
+              <a:t>, </a:t>
+            </a:r>
+            <a:r>
+              <a:rPr lang="ko-KR" altLang="en-US" sz="1400" dirty="0" smtClean="0"/>
+              <a:t>클라이언트는 실시간으로 이벤트를 수신</a:t>
+            </a:r>
+            <a:endParaRPr lang="en-US" altLang="ko-KR" sz="1400" dirty="0" smtClean="0"/>
+          </a:p>
+          <a:p>
+            <a:endParaRPr lang="en-US" altLang="ko-KR" sz="1400" dirty="0"/>
+          </a:p>
+          <a:p>
+            <a:pPr marL="342900" indent="-342900">
+              <a:buAutoNum type="arabicPeriod"/>
+            </a:pPr>
+            <a:r>
+              <a:rPr lang="ko-KR" altLang="en-US" sz="1400" dirty="0" smtClean="0"/>
+              <a:t>일반적인 </a:t>
+            </a:r>
+            <a:r>
+              <a:rPr lang="ko-KR" altLang="en-US" sz="1400" dirty="0" err="1" smtClean="0"/>
+              <a:t>웹소켓과</a:t>
+            </a:r>
+            <a:r>
+              <a:rPr lang="ko-KR" altLang="en-US" sz="1400" dirty="0" smtClean="0"/>
+              <a:t> 비교하면</a:t>
+            </a:r>
+            <a:r>
+              <a:rPr lang="en-US" altLang="ko-KR" sz="1400" dirty="0" smtClean="0"/>
+              <a:t>, SSE</a:t>
+            </a:r>
+            <a:r>
+              <a:rPr lang="ko-KR" altLang="en-US" sz="1400" dirty="0" smtClean="0"/>
+              <a:t>는 </a:t>
+            </a:r>
+            <a:r>
+              <a:rPr lang="ko-KR" altLang="en-US" sz="1400" dirty="0" err="1" smtClean="0"/>
+              <a:t>단방향</a:t>
+            </a:r>
+            <a:r>
+              <a:rPr lang="ko-KR" altLang="en-US" sz="1400" dirty="0" smtClean="0"/>
+              <a:t> </a:t>
+            </a:r>
+            <a:r>
+              <a:rPr lang="ko-KR" altLang="en-US" sz="1400" dirty="0" err="1" smtClean="0"/>
+              <a:t>통신만을</a:t>
+            </a:r>
+            <a:r>
+              <a:rPr lang="ko-KR" altLang="en-US" sz="1400" dirty="0" smtClean="0"/>
+              <a:t> 지원하며</a:t>
+            </a:r>
+            <a:r>
+              <a:rPr lang="en-US" altLang="ko-KR" sz="1400" dirty="0" smtClean="0"/>
+              <a:t>, </a:t>
+            </a:r>
+            <a:r>
+              <a:rPr lang="ko-KR" altLang="en-US" sz="1400" dirty="0" smtClean="0"/>
+              <a:t>추가적인 설정 없이도 웹 브라우저에서 내장된 기능으로 지원</a:t>
+            </a:r>
+            <a:endParaRPr lang="en-US" altLang="ko-KR" sz="1400" dirty="0" smtClean="0"/>
+          </a:p>
+          <a:p>
+            <a:pPr marL="342900" indent="-342900">
+              <a:buAutoNum type="arabicPeriod"/>
+            </a:pPr>
+            <a:r>
+              <a:rPr lang="en-US" altLang="ko-KR" sz="1400" dirty="0" smtClean="0"/>
+              <a:t>SSE</a:t>
+            </a:r>
+            <a:r>
+              <a:rPr lang="ko-KR" altLang="en-US" sz="1400" dirty="0" smtClean="0"/>
+              <a:t>는 서버에서 클라이언트로만 데이터를 전송하는 </a:t>
+            </a:r>
+            <a:r>
+              <a:rPr lang="ko-KR" altLang="en-US" sz="1400" dirty="0" err="1" smtClean="0"/>
+              <a:t>단방향</a:t>
+            </a:r>
+            <a:r>
+              <a:rPr lang="ko-KR" altLang="en-US" sz="1400" dirty="0" smtClean="0"/>
+              <a:t> 통신</a:t>
+            </a:r>
+            <a:r>
+              <a:rPr lang="en-US" altLang="ko-KR" sz="1400" dirty="0" smtClean="0"/>
+              <a:t>. </a:t>
+            </a:r>
+            <a:r>
+              <a:rPr lang="ko-KR" altLang="en-US" sz="1400" dirty="0" smtClean="0"/>
+              <a:t>클라이언트는 서버로부터 이벤트를 수신하며</a:t>
+            </a:r>
+            <a:r>
+              <a:rPr lang="en-US" altLang="ko-KR" sz="1400" dirty="0" smtClean="0"/>
+              <a:t>, </a:t>
+            </a:r>
+            <a:r>
+              <a:rPr lang="ko-KR" altLang="en-US" sz="1400" dirty="0" smtClean="0"/>
+              <a:t>서버로부터의 요청은 </a:t>
+            </a:r>
+            <a:r>
+              <a:rPr lang="ko-KR" altLang="en-US" sz="1400" dirty="0" err="1" smtClean="0"/>
+              <a:t>지원안함</a:t>
+            </a:r>
+            <a:endParaRPr lang="en-US" altLang="ko-KR" sz="1400" dirty="0" smtClean="0"/>
+          </a:p>
+          <a:p>
+            <a:pPr marL="342900" indent="-342900">
+              <a:buAutoNum type="arabicPeriod"/>
+            </a:pPr>
+            <a:r>
+              <a:rPr lang="en-US" altLang="ko-KR" sz="1400" dirty="0" smtClean="0"/>
+              <a:t>SSE</a:t>
+            </a:r>
+            <a:r>
+              <a:rPr lang="ko-KR" altLang="en-US" sz="1400" dirty="0" smtClean="0"/>
+              <a:t>는 텍스트 기반 형식으로 데이터 전송</a:t>
+            </a:r>
+            <a:r>
+              <a:rPr lang="en-US" altLang="ko-KR" sz="1400" dirty="0" smtClean="0"/>
+              <a:t>. </a:t>
+            </a:r>
+            <a:r>
+              <a:rPr lang="ko-KR" altLang="en-US" sz="1400" dirty="0" smtClean="0"/>
+              <a:t>이벤트는 </a:t>
+            </a:r>
+            <a:r>
+              <a:rPr lang="en-US" altLang="ko-KR" sz="1400" dirty="0" smtClean="0"/>
+              <a:t>data, event, id, retry</a:t>
+            </a:r>
+            <a:r>
+              <a:rPr lang="ko-KR" altLang="en-US" sz="1400" dirty="0" smtClean="0"/>
+              <a:t>와 같은 필드로 구성된 텍스트 형태로 클라이언트로 전송</a:t>
+            </a:r>
+            <a:endParaRPr lang="en-US" altLang="ko-KR" sz="1400" dirty="0" smtClean="0"/>
+          </a:p>
+          <a:p>
+            <a:pPr marL="342900" indent="-342900">
+              <a:buAutoNum type="arabicPeriod"/>
+            </a:pPr>
+            <a:r>
+              <a:rPr lang="en-US" altLang="ko-KR" sz="1400" dirty="0" smtClean="0"/>
+              <a:t>SSE</a:t>
+            </a:r>
+            <a:r>
+              <a:rPr lang="ko-KR" altLang="en-US" sz="1400" dirty="0" smtClean="0"/>
+              <a:t>는 기존의 </a:t>
+            </a:r>
+            <a:r>
+              <a:rPr lang="en-US" altLang="ko-KR" sz="1400" dirty="0" smtClean="0"/>
+              <a:t>HTTP </a:t>
+            </a:r>
+            <a:r>
+              <a:rPr lang="ko-KR" altLang="en-US" sz="1400" dirty="0" smtClean="0"/>
+              <a:t>연결을 재사용하여 데이터를 전송</a:t>
+            </a:r>
+            <a:r>
+              <a:rPr lang="en-US" altLang="ko-KR" sz="1400" dirty="0" smtClean="0"/>
+              <a:t>. </a:t>
+            </a:r>
+            <a:r>
+              <a:rPr lang="ko-KR" altLang="en-US" sz="1400" dirty="0" smtClean="0"/>
+              <a:t>따라서 별도의 프로토콜이나 서버 구성 필요 </a:t>
+            </a:r>
+            <a:r>
+              <a:rPr lang="en-US" altLang="ko-KR" sz="1400" dirty="0" smtClean="0"/>
+              <a:t>x</a:t>
+            </a:r>
+          </a:p>
+          <a:p>
+            <a:pPr marL="342900" indent="-342900">
+              <a:buAutoNum type="arabicPeriod"/>
+            </a:pPr>
+            <a:endParaRPr lang="en-US" altLang="ko-KR" sz="1400" dirty="0"/>
+          </a:p>
+          <a:p>
+            <a:endParaRPr lang="ko-KR" altLang="en-US" sz="1400" dirty="0"/>
+          </a:p>
+        </p:txBody>
+      </p:sp>
+      <p:grpSp>
+        <p:nvGrpSpPr>
+          <p:cNvPr id="15" name="그룹 14"/>
+          <p:cNvGrpSpPr/>
+          <p:nvPr/>
+        </p:nvGrpSpPr>
+        <p:grpSpPr>
+          <a:xfrm>
+            <a:off x="702398" y="3422729"/>
+            <a:ext cx="2012481" cy="3435271"/>
+            <a:chOff x="702398" y="3422729"/>
+            <a:chExt cx="2012481" cy="3435271"/>
+          </a:xfrm>
+        </p:grpSpPr>
+        <p:sp>
+          <p:nvSpPr>
+            <p:cNvPr id="5" name="직사각형 4"/>
+            <p:cNvSpPr/>
+            <p:nvPr/>
+          </p:nvSpPr>
+          <p:spPr>
+            <a:xfrm>
+              <a:off x="702398" y="3441875"/>
+              <a:ext cx="791424" cy="379207"/>
+            </a:xfrm>
+            <a:prstGeom prst="rect">
+              <a:avLst/>
+            </a:prstGeom>
+          </p:spPr>
+          <p:style>
+            <a:lnRef idx="2">
+              <a:schemeClr val="accent1">
+                <a:shade val="50000"/>
+              </a:schemeClr>
+            </a:lnRef>
+            <a:fillRef idx="1">
+              <a:schemeClr val="accent1"/>
+            </a:fillRef>
+            <a:effectRef idx="0">
+              <a:schemeClr val="accent1"/>
+            </a:effectRef>
+            <a:fontRef idx="minor">
+              <a:schemeClr val="lt1"/>
+            </a:fontRef>
+          </p:style>
+          <p:txBody>
+            <a:bodyPr rtlCol="0" anchor="ctr"/>
+            <a:lstStyle/>
+            <a:p>
+              <a:pPr algn="ctr"/>
+              <a:r>
+                <a:rPr lang="en-US" altLang="ko-KR" sz="1200" dirty="0" smtClean="0"/>
+                <a:t>Browser</a:t>
+              </a:r>
+              <a:endParaRPr lang="ko-KR" altLang="en-US" sz="1200" dirty="0"/>
+            </a:p>
+          </p:txBody>
+        </p:sp>
+        <p:sp>
+          <p:nvSpPr>
+            <p:cNvPr id="6" name="모서리가 둥근 직사각형 5"/>
+            <p:cNvSpPr/>
+            <p:nvPr/>
+          </p:nvSpPr>
+          <p:spPr>
+            <a:xfrm>
+              <a:off x="2044923" y="3422729"/>
+              <a:ext cx="669956" cy="398353"/>
+            </a:xfrm>
+            <a:prstGeom prst="roundRect">
+              <a:avLst/>
+            </a:prstGeom>
+          </p:spPr>
+          <p:style>
+            <a:lnRef idx="2">
+              <a:schemeClr val="accent1">
+                <a:shade val="50000"/>
+              </a:schemeClr>
+            </a:lnRef>
+            <a:fillRef idx="1">
+              <a:schemeClr val="accent1"/>
+            </a:fillRef>
+            <a:effectRef idx="0">
+              <a:schemeClr val="accent1"/>
+            </a:effectRef>
+            <a:fontRef idx="minor">
+              <a:schemeClr val="lt1"/>
+            </a:fontRef>
+          </p:style>
+          <p:txBody>
+            <a:bodyPr rtlCol="0" anchor="ctr"/>
+            <a:lstStyle/>
+            <a:p>
+              <a:pPr algn="ctr"/>
+              <a:r>
+                <a:rPr lang="en-US" altLang="ko-KR" sz="1200" dirty="0" smtClean="0"/>
+                <a:t>Server</a:t>
+              </a:r>
+              <a:endParaRPr lang="ko-KR" altLang="en-US" sz="1200" dirty="0"/>
+            </a:p>
+          </p:txBody>
+        </p:sp>
+        <p:cxnSp>
+          <p:nvCxnSpPr>
+            <p:cNvPr id="12" name="직선 연결선 11"/>
+            <p:cNvCxnSpPr>
+              <a:stCxn id="5" idx="2"/>
+            </p:cNvCxnSpPr>
+            <p:nvPr/>
+          </p:nvCxnSpPr>
+          <p:spPr>
+            <a:xfrm flipH="1">
+              <a:off x="1095469" y="3821082"/>
+              <a:ext cx="2641" cy="3036918"/>
+            </a:xfrm>
+            <a:prstGeom prst="line">
+              <a:avLst/>
+            </a:prstGeom>
+          </p:spPr>
+          <p:style>
+            <a:lnRef idx="1">
+              <a:schemeClr val="accent1"/>
+            </a:lnRef>
+            <a:fillRef idx="0">
+              <a:schemeClr val="accent1"/>
+            </a:fillRef>
+            <a:effectRef idx="0">
+              <a:schemeClr val="accent1"/>
+            </a:effectRef>
+            <a:fontRef idx="minor">
+              <a:schemeClr val="tx1"/>
+            </a:fontRef>
+          </p:style>
+        </p:cxnSp>
+        <p:cxnSp>
+          <p:nvCxnSpPr>
+            <p:cNvPr id="14" name="직선 연결선 13"/>
+            <p:cNvCxnSpPr>
+              <a:stCxn id="6" idx="2"/>
+            </p:cNvCxnSpPr>
+            <p:nvPr/>
+          </p:nvCxnSpPr>
+          <p:spPr>
+            <a:xfrm flipH="1">
+              <a:off x="2378581" y="3821082"/>
+              <a:ext cx="1320" cy="3036918"/>
+            </a:xfrm>
+            <a:prstGeom prst="line">
+              <a:avLst/>
+            </a:prstGeom>
+          </p:spPr>
+          <p:style>
+            <a:lnRef idx="1">
+              <a:schemeClr val="accent1"/>
+            </a:lnRef>
+            <a:fillRef idx="0">
+              <a:schemeClr val="accent1"/>
+            </a:fillRef>
+            <a:effectRef idx="0">
+              <a:schemeClr val="accent1"/>
+            </a:effectRef>
+            <a:fontRef idx="minor">
+              <a:schemeClr val="tx1"/>
+            </a:fontRef>
+          </p:style>
+        </p:cxnSp>
+      </p:grpSp>
+      <p:grpSp>
+        <p:nvGrpSpPr>
+          <p:cNvPr id="16" name="그룹 15"/>
+          <p:cNvGrpSpPr/>
+          <p:nvPr/>
+        </p:nvGrpSpPr>
+        <p:grpSpPr>
+          <a:xfrm>
+            <a:off x="4608505" y="3422729"/>
+            <a:ext cx="2012481" cy="3435271"/>
+            <a:chOff x="702398" y="3422729"/>
+            <a:chExt cx="2012481" cy="3435271"/>
+          </a:xfrm>
+        </p:grpSpPr>
+        <p:sp>
+          <p:nvSpPr>
+            <p:cNvPr id="17" name="직사각형 16"/>
+            <p:cNvSpPr/>
+            <p:nvPr/>
+          </p:nvSpPr>
+          <p:spPr>
+            <a:xfrm>
+              <a:off x="702398" y="3441875"/>
+              <a:ext cx="791424" cy="379207"/>
+            </a:xfrm>
+            <a:prstGeom prst="rect">
+              <a:avLst/>
+            </a:prstGeom>
+          </p:spPr>
+          <p:style>
+            <a:lnRef idx="2">
+              <a:schemeClr val="accent1">
+                <a:shade val="50000"/>
+              </a:schemeClr>
+            </a:lnRef>
+            <a:fillRef idx="1">
+              <a:schemeClr val="accent1"/>
+            </a:fillRef>
+            <a:effectRef idx="0">
+              <a:schemeClr val="accent1"/>
+            </a:effectRef>
+            <a:fontRef idx="minor">
+              <a:schemeClr val="lt1"/>
+            </a:fontRef>
+          </p:style>
+          <p:txBody>
+            <a:bodyPr rtlCol="0" anchor="ctr"/>
+            <a:lstStyle/>
+            <a:p>
+              <a:pPr algn="ctr"/>
+              <a:r>
+                <a:rPr lang="en-US" altLang="ko-KR" sz="1200" dirty="0" smtClean="0"/>
+                <a:t>Browser</a:t>
+              </a:r>
+              <a:endParaRPr lang="ko-KR" altLang="en-US" sz="1200" dirty="0"/>
+            </a:p>
+          </p:txBody>
+        </p:sp>
+        <p:sp>
+          <p:nvSpPr>
+            <p:cNvPr id="18" name="모서리가 둥근 직사각형 17"/>
+            <p:cNvSpPr/>
+            <p:nvPr/>
+          </p:nvSpPr>
+          <p:spPr>
+            <a:xfrm>
+              <a:off x="2044923" y="3422729"/>
+              <a:ext cx="669956" cy="398353"/>
+            </a:xfrm>
+            <a:prstGeom prst="roundRect">
+              <a:avLst/>
+            </a:prstGeom>
+          </p:spPr>
+          <p:style>
+            <a:lnRef idx="2">
+              <a:schemeClr val="accent1">
+                <a:shade val="50000"/>
+              </a:schemeClr>
+            </a:lnRef>
+            <a:fillRef idx="1">
+              <a:schemeClr val="accent1"/>
+            </a:fillRef>
+            <a:effectRef idx="0">
+              <a:schemeClr val="accent1"/>
+            </a:effectRef>
+            <a:fontRef idx="minor">
+              <a:schemeClr val="lt1"/>
+            </a:fontRef>
+          </p:style>
+          <p:txBody>
+            <a:bodyPr rtlCol="0" anchor="ctr"/>
+            <a:lstStyle/>
+            <a:p>
+              <a:pPr algn="ctr"/>
+              <a:r>
+                <a:rPr lang="en-US" altLang="ko-KR" sz="1200" dirty="0" smtClean="0"/>
+                <a:t>Server</a:t>
+              </a:r>
+              <a:endParaRPr lang="ko-KR" altLang="en-US" sz="1200" dirty="0"/>
+            </a:p>
+          </p:txBody>
+        </p:sp>
+        <p:cxnSp>
+          <p:nvCxnSpPr>
+            <p:cNvPr id="19" name="직선 연결선 18"/>
+            <p:cNvCxnSpPr>
+              <a:stCxn id="17" idx="2"/>
+            </p:cNvCxnSpPr>
+            <p:nvPr/>
+          </p:nvCxnSpPr>
+          <p:spPr>
+            <a:xfrm flipH="1">
+              <a:off x="1095469" y="3821082"/>
+              <a:ext cx="2641" cy="3036918"/>
+            </a:xfrm>
+            <a:prstGeom prst="line">
+              <a:avLst/>
+            </a:prstGeom>
+          </p:spPr>
+          <p:style>
+            <a:lnRef idx="1">
+              <a:schemeClr val="accent1"/>
+            </a:lnRef>
+            <a:fillRef idx="0">
+              <a:schemeClr val="accent1"/>
+            </a:fillRef>
+            <a:effectRef idx="0">
+              <a:schemeClr val="accent1"/>
+            </a:effectRef>
+            <a:fontRef idx="minor">
+              <a:schemeClr val="tx1"/>
+            </a:fontRef>
+          </p:style>
+        </p:cxnSp>
+        <p:cxnSp>
+          <p:nvCxnSpPr>
+            <p:cNvPr id="20" name="직선 연결선 19"/>
+            <p:cNvCxnSpPr>
+              <a:stCxn id="18" idx="2"/>
+            </p:cNvCxnSpPr>
+            <p:nvPr/>
+          </p:nvCxnSpPr>
+          <p:spPr>
+            <a:xfrm flipH="1">
+              <a:off x="2378581" y="3821082"/>
+              <a:ext cx="1320" cy="3036918"/>
+            </a:xfrm>
+            <a:prstGeom prst="line">
+              <a:avLst/>
+            </a:prstGeom>
+          </p:spPr>
+          <p:style>
+            <a:lnRef idx="1">
+              <a:schemeClr val="accent1"/>
+            </a:lnRef>
+            <a:fillRef idx="0">
+              <a:schemeClr val="accent1"/>
+            </a:fillRef>
+            <a:effectRef idx="0">
+              <a:schemeClr val="accent1"/>
+            </a:effectRef>
+            <a:fontRef idx="minor">
+              <a:schemeClr val="tx1"/>
+            </a:fontRef>
+          </p:style>
+        </p:cxnSp>
+      </p:grpSp>
+      <p:grpSp>
+        <p:nvGrpSpPr>
+          <p:cNvPr id="21" name="그룹 20"/>
+          <p:cNvGrpSpPr/>
+          <p:nvPr/>
+        </p:nvGrpSpPr>
+        <p:grpSpPr>
+          <a:xfrm>
+            <a:off x="8636080" y="3422729"/>
+            <a:ext cx="2012481" cy="3435271"/>
+            <a:chOff x="702398" y="3422729"/>
+            <a:chExt cx="2012481" cy="3435271"/>
+          </a:xfrm>
+        </p:grpSpPr>
+        <p:sp>
+          <p:nvSpPr>
+            <p:cNvPr id="22" name="직사각형 21"/>
+            <p:cNvSpPr/>
+            <p:nvPr/>
+          </p:nvSpPr>
+          <p:spPr>
+            <a:xfrm>
+              <a:off x="702398" y="3441875"/>
+              <a:ext cx="791424" cy="379207"/>
+            </a:xfrm>
+            <a:prstGeom prst="rect">
+              <a:avLst/>
+            </a:prstGeom>
+          </p:spPr>
+          <p:style>
+            <a:lnRef idx="2">
+              <a:schemeClr val="accent1">
+                <a:shade val="50000"/>
+              </a:schemeClr>
+            </a:lnRef>
+            <a:fillRef idx="1">
+              <a:schemeClr val="accent1"/>
+            </a:fillRef>
+            <a:effectRef idx="0">
+              <a:schemeClr val="accent1"/>
+            </a:effectRef>
+            <a:fontRef idx="minor">
+              <a:schemeClr val="lt1"/>
+            </a:fontRef>
+          </p:style>
+          <p:txBody>
+            <a:bodyPr rtlCol="0" anchor="ctr"/>
+            <a:lstStyle/>
+            <a:p>
+              <a:pPr algn="ctr"/>
+              <a:r>
+                <a:rPr lang="en-US" altLang="ko-KR" sz="1200" dirty="0" smtClean="0"/>
+                <a:t>Browser</a:t>
+              </a:r>
+              <a:endParaRPr lang="ko-KR" altLang="en-US" sz="1200" dirty="0"/>
+            </a:p>
+          </p:txBody>
+        </p:sp>
+        <p:sp>
+          <p:nvSpPr>
+            <p:cNvPr id="23" name="모서리가 둥근 직사각형 22"/>
+            <p:cNvSpPr/>
+            <p:nvPr/>
+          </p:nvSpPr>
+          <p:spPr>
+            <a:xfrm>
+              <a:off x="2044923" y="3422729"/>
+              <a:ext cx="669956" cy="398353"/>
+            </a:xfrm>
+            <a:prstGeom prst="roundRect">
+              <a:avLst/>
+            </a:prstGeom>
+          </p:spPr>
+          <p:style>
+            <a:lnRef idx="2">
+              <a:schemeClr val="accent1">
+                <a:shade val="50000"/>
+              </a:schemeClr>
+            </a:lnRef>
+            <a:fillRef idx="1">
+              <a:schemeClr val="accent1"/>
+            </a:fillRef>
+            <a:effectRef idx="0">
+              <a:schemeClr val="accent1"/>
+            </a:effectRef>
+            <a:fontRef idx="minor">
+              <a:schemeClr val="lt1"/>
+            </a:fontRef>
+          </p:style>
+          <p:txBody>
+            <a:bodyPr rtlCol="0" anchor="ctr"/>
+            <a:lstStyle/>
+            <a:p>
+              <a:pPr algn="ctr"/>
+              <a:r>
+                <a:rPr lang="en-US" altLang="ko-KR" sz="1200" dirty="0" smtClean="0"/>
+                <a:t>Server</a:t>
+              </a:r>
+              <a:endParaRPr lang="ko-KR" altLang="en-US" sz="1200" dirty="0"/>
+            </a:p>
+          </p:txBody>
+        </p:sp>
+        <p:cxnSp>
+          <p:nvCxnSpPr>
+            <p:cNvPr id="24" name="직선 연결선 23"/>
+            <p:cNvCxnSpPr>
+              <a:stCxn id="22" idx="2"/>
+            </p:cNvCxnSpPr>
+            <p:nvPr/>
+          </p:nvCxnSpPr>
+          <p:spPr>
+            <a:xfrm flipH="1">
+              <a:off x="1095469" y="3821082"/>
+              <a:ext cx="2641" cy="3036918"/>
+            </a:xfrm>
+            <a:prstGeom prst="line">
+              <a:avLst/>
+            </a:prstGeom>
+          </p:spPr>
+          <p:style>
+            <a:lnRef idx="1">
+              <a:schemeClr val="accent1"/>
+            </a:lnRef>
+            <a:fillRef idx="0">
+              <a:schemeClr val="accent1"/>
+            </a:fillRef>
+            <a:effectRef idx="0">
+              <a:schemeClr val="accent1"/>
+            </a:effectRef>
+            <a:fontRef idx="minor">
+              <a:schemeClr val="tx1"/>
+            </a:fontRef>
+          </p:style>
+        </p:cxnSp>
+        <p:cxnSp>
+          <p:nvCxnSpPr>
+            <p:cNvPr id="25" name="직선 연결선 24"/>
+            <p:cNvCxnSpPr>
+              <a:stCxn id="23" idx="2"/>
+            </p:cNvCxnSpPr>
+            <p:nvPr/>
+          </p:nvCxnSpPr>
+          <p:spPr>
+            <a:xfrm flipH="1">
+              <a:off x="2378581" y="3821082"/>
+              <a:ext cx="1320" cy="3036918"/>
+            </a:xfrm>
+            <a:prstGeom prst="line">
+              <a:avLst/>
+            </a:prstGeom>
+          </p:spPr>
+          <p:style>
+            <a:lnRef idx="1">
+              <a:schemeClr val="accent1"/>
+            </a:lnRef>
+            <a:fillRef idx="0">
+              <a:schemeClr val="accent1"/>
+            </a:fillRef>
+            <a:effectRef idx="0">
+              <a:schemeClr val="accent1"/>
+            </a:effectRef>
+            <a:fontRef idx="minor">
+              <a:schemeClr val="tx1"/>
+            </a:fontRef>
+          </p:style>
+        </p:cxnSp>
+      </p:grpSp>
+      <p:cxnSp>
+        <p:nvCxnSpPr>
+          <p:cNvPr id="27" name="직선 화살표 연결선 26"/>
+          <p:cNvCxnSpPr/>
+          <p:nvPr/>
+        </p:nvCxnSpPr>
+        <p:spPr>
+          <a:xfrm>
+            <a:off x="1095469" y="4128380"/>
+            <a:ext cx="1283112" cy="289711"/>
+          </a:xfrm>
+          <a:prstGeom prst="straightConnector1">
+            <a:avLst/>
+          </a:prstGeom>
+          <a:ln>
+            <a:tailEnd type="triangle"/>
+          </a:ln>
+        </p:spPr>
+        <p:style>
+          <a:lnRef idx="1">
+            <a:schemeClr val="accent1"/>
+          </a:lnRef>
+          <a:fillRef idx="0">
+            <a:schemeClr val="accent1"/>
+          </a:fillRef>
+          <a:effectRef idx="0">
+            <a:schemeClr val="accent1"/>
+          </a:effectRef>
+          <a:fontRef idx="minor">
+            <a:schemeClr val="tx1"/>
+          </a:fontRef>
+        </p:style>
+      </p:cxnSp>
+      <p:cxnSp>
+        <p:nvCxnSpPr>
+          <p:cNvPr id="29" name="직선 화살표 연결선 28"/>
+          <p:cNvCxnSpPr/>
+          <p:nvPr/>
+        </p:nvCxnSpPr>
+        <p:spPr>
+          <a:xfrm flipH="1">
+            <a:off x="1095469" y="4445251"/>
+            <a:ext cx="1283112" cy="559831"/>
+          </a:xfrm>
+          <a:prstGeom prst="straightConnector1">
+            <a:avLst/>
+          </a:prstGeom>
+          <a:ln>
+            <a:tailEnd type="triangle"/>
+          </a:ln>
+        </p:spPr>
+        <p:style>
+          <a:lnRef idx="1">
+            <a:schemeClr val="accent1"/>
+          </a:lnRef>
+          <a:fillRef idx="0">
+            <a:schemeClr val="accent1"/>
+          </a:fillRef>
+          <a:effectRef idx="0">
+            <a:schemeClr val="accent1"/>
+          </a:effectRef>
+          <a:fontRef idx="minor">
+            <a:schemeClr val="tx1"/>
+          </a:fontRef>
+        </p:style>
+      </p:cxnSp>
+      <p:cxnSp>
+        <p:nvCxnSpPr>
+          <p:cNvPr id="31" name="직선 화살표 연결선 30"/>
+          <p:cNvCxnSpPr/>
+          <p:nvPr/>
+        </p:nvCxnSpPr>
+        <p:spPr>
+          <a:xfrm>
+            <a:off x="1095469" y="5059625"/>
+            <a:ext cx="1283112" cy="323041"/>
+          </a:xfrm>
+          <a:prstGeom prst="straightConnector1">
+            <a:avLst/>
+          </a:prstGeom>
+          <a:ln>
+            <a:tailEnd type="triangle"/>
+          </a:ln>
+        </p:spPr>
+        <p:style>
+          <a:lnRef idx="1">
+            <a:schemeClr val="accent1"/>
+          </a:lnRef>
+          <a:fillRef idx="0">
+            <a:schemeClr val="accent1"/>
+          </a:fillRef>
+          <a:effectRef idx="0">
+            <a:schemeClr val="accent1"/>
+          </a:effectRef>
+          <a:fontRef idx="minor">
+            <a:schemeClr val="tx1"/>
+          </a:fontRef>
+        </p:style>
+      </p:cxnSp>
+      <p:cxnSp>
+        <p:nvCxnSpPr>
+          <p:cNvPr id="33" name="직선 화살표 연결선 32"/>
+          <p:cNvCxnSpPr/>
+          <p:nvPr/>
+        </p:nvCxnSpPr>
+        <p:spPr>
+          <a:xfrm flipH="1">
+            <a:off x="1095469" y="5382666"/>
+            <a:ext cx="1283112" cy="610728"/>
+          </a:xfrm>
+          <a:prstGeom prst="straightConnector1">
+            <a:avLst/>
+          </a:prstGeom>
+          <a:ln>
+            <a:tailEnd type="triangle"/>
+          </a:ln>
+        </p:spPr>
+        <p:style>
+          <a:lnRef idx="1">
+            <a:schemeClr val="accent1"/>
+          </a:lnRef>
+          <a:fillRef idx="0">
+            <a:schemeClr val="accent1"/>
+          </a:fillRef>
+          <a:effectRef idx="0">
+            <a:schemeClr val="accent1"/>
+          </a:effectRef>
+          <a:fontRef idx="minor">
+            <a:schemeClr val="tx1"/>
+          </a:fontRef>
+        </p:style>
+      </p:cxnSp>
+      <p:cxnSp>
+        <p:nvCxnSpPr>
+          <p:cNvPr id="35" name="직선 화살표 연결선 34"/>
+          <p:cNvCxnSpPr/>
+          <p:nvPr/>
+        </p:nvCxnSpPr>
+        <p:spPr>
+          <a:xfrm>
+            <a:off x="5001576" y="4134989"/>
+            <a:ext cx="1283112" cy="337645"/>
+          </a:xfrm>
+          <a:prstGeom prst="straightConnector1">
+            <a:avLst/>
+          </a:prstGeom>
+          <a:ln>
+            <a:tailEnd type="triangle"/>
+          </a:ln>
+        </p:spPr>
+        <p:style>
+          <a:lnRef idx="1">
+            <a:schemeClr val="accent1"/>
+          </a:lnRef>
+          <a:fillRef idx="0">
+            <a:schemeClr val="accent1"/>
+          </a:fillRef>
+          <a:effectRef idx="0">
+            <a:schemeClr val="accent1"/>
+          </a:effectRef>
+          <a:fontRef idx="minor">
+            <a:schemeClr val="tx1"/>
+          </a:fontRef>
+        </p:style>
+      </p:cxnSp>
+      <p:cxnSp>
+        <p:nvCxnSpPr>
+          <p:cNvPr id="37" name="직선 화살표 연결선 36"/>
+          <p:cNvCxnSpPr/>
+          <p:nvPr/>
+        </p:nvCxnSpPr>
+        <p:spPr>
+          <a:xfrm flipH="1">
+            <a:off x="5001576" y="5758004"/>
+            <a:ext cx="1283112" cy="235390"/>
+          </a:xfrm>
+          <a:prstGeom prst="straightConnector1">
+            <a:avLst/>
+          </a:prstGeom>
+          <a:ln>
+            <a:tailEnd type="triangle"/>
+          </a:ln>
+        </p:spPr>
+        <p:style>
+          <a:lnRef idx="1">
+            <a:schemeClr val="accent1"/>
+          </a:lnRef>
+          <a:fillRef idx="0">
+            <a:schemeClr val="accent1"/>
+          </a:fillRef>
+          <a:effectRef idx="0">
+            <a:schemeClr val="accent1"/>
+          </a:effectRef>
+          <a:fontRef idx="minor">
+            <a:schemeClr val="tx1"/>
+          </a:fontRef>
+        </p:style>
+      </p:cxnSp>
+      <p:cxnSp>
+        <p:nvCxnSpPr>
+          <p:cNvPr id="39" name="직선 화살표 연결선 38"/>
+          <p:cNvCxnSpPr/>
+          <p:nvPr/>
+        </p:nvCxnSpPr>
+        <p:spPr>
+          <a:xfrm>
+            <a:off x="9029151" y="4200808"/>
+            <a:ext cx="1283112" cy="217283"/>
+          </a:xfrm>
+          <a:prstGeom prst="straightConnector1">
+            <a:avLst/>
+          </a:prstGeom>
+          <a:ln>
+            <a:tailEnd type="triangle"/>
+          </a:ln>
+        </p:spPr>
+        <p:style>
+          <a:lnRef idx="1">
+            <a:schemeClr val="accent1"/>
+          </a:lnRef>
+          <a:fillRef idx="0">
+            <a:schemeClr val="accent1"/>
+          </a:fillRef>
+          <a:effectRef idx="0">
+            <a:schemeClr val="accent1"/>
+          </a:effectRef>
+          <a:fontRef idx="minor">
+            <a:schemeClr val="tx1"/>
+          </a:fontRef>
+        </p:style>
+      </p:cxnSp>
+      <p:cxnSp>
+        <p:nvCxnSpPr>
+          <p:cNvPr id="41" name="직선 화살표 연결선 40"/>
+          <p:cNvCxnSpPr/>
+          <p:nvPr/>
+        </p:nvCxnSpPr>
+        <p:spPr>
+          <a:xfrm flipH="1">
+            <a:off x="9029151" y="4472634"/>
+            <a:ext cx="1283112" cy="393874"/>
+          </a:xfrm>
+          <a:prstGeom prst="straightConnector1">
+            <a:avLst/>
+          </a:prstGeom>
+          <a:ln>
+            <a:tailEnd type="triangle"/>
+          </a:ln>
+        </p:spPr>
+        <p:style>
+          <a:lnRef idx="1">
+            <a:schemeClr val="accent1"/>
+          </a:lnRef>
+          <a:fillRef idx="0">
+            <a:schemeClr val="accent1"/>
+          </a:fillRef>
+          <a:effectRef idx="0">
+            <a:schemeClr val="accent1"/>
+          </a:effectRef>
+          <a:fontRef idx="minor">
+            <a:schemeClr val="tx1"/>
+          </a:fontRef>
+        </p:style>
+      </p:cxnSp>
+      <p:cxnSp>
+        <p:nvCxnSpPr>
+          <p:cNvPr id="43" name="직선 화살표 연결선 42"/>
+          <p:cNvCxnSpPr/>
+          <p:nvPr/>
+        </p:nvCxnSpPr>
+        <p:spPr>
+          <a:xfrm flipH="1">
+            <a:off x="9029151" y="4607694"/>
+            <a:ext cx="1283112" cy="613451"/>
+          </a:xfrm>
+          <a:prstGeom prst="straightConnector1">
+            <a:avLst/>
+          </a:prstGeom>
+          <a:ln>
+            <a:tailEnd type="triangle"/>
+          </a:ln>
+        </p:spPr>
+        <p:style>
+          <a:lnRef idx="1">
+            <a:schemeClr val="accent1"/>
+          </a:lnRef>
+          <a:fillRef idx="0">
+            <a:schemeClr val="accent1"/>
+          </a:fillRef>
+          <a:effectRef idx="0">
+            <a:schemeClr val="accent1"/>
+          </a:effectRef>
+          <a:fontRef idx="minor">
+            <a:schemeClr val="tx1"/>
+          </a:fontRef>
+        </p:style>
+      </p:cxnSp>
+      <p:cxnSp>
+        <p:nvCxnSpPr>
+          <p:cNvPr id="45" name="직선 화살표 연결선 44"/>
+          <p:cNvCxnSpPr/>
+          <p:nvPr/>
+        </p:nvCxnSpPr>
+        <p:spPr>
+          <a:xfrm>
+            <a:off x="9029151" y="5468293"/>
+            <a:ext cx="1283112" cy="219737"/>
+          </a:xfrm>
+          <a:prstGeom prst="straightConnector1">
+            <a:avLst/>
+          </a:prstGeom>
+          <a:ln>
+            <a:tailEnd type="triangle"/>
+          </a:ln>
+        </p:spPr>
+        <p:style>
+          <a:lnRef idx="1">
+            <a:schemeClr val="accent1"/>
+          </a:lnRef>
+          <a:fillRef idx="0">
+            <a:schemeClr val="accent1"/>
+          </a:fillRef>
+          <a:effectRef idx="0">
+            <a:schemeClr val="accent1"/>
+          </a:effectRef>
+          <a:fontRef idx="minor">
+            <a:schemeClr val="tx1"/>
+          </a:fontRef>
+        </p:style>
+      </p:cxnSp>
+      <p:cxnSp>
+        <p:nvCxnSpPr>
+          <p:cNvPr id="47" name="직선 화살표 연결선 46"/>
+          <p:cNvCxnSpPr/>
+          <p:nvPr/>
+        </p:nvCxnSpPr>
+        <p:spPr>
+          <a:xfrm>
+            <a:off x="9029151" y="5578161"/>
+            <a:ext cx="1283112" cy="297538"/>
+          </a:xfrm>
+          <a:prstGeom prst="straightConnector1">
+            <a:avLst/>
+          </a:prstGeom>
+          <a:ln>
+            <a:tailEnd type="triangle"/>
+          </a:ln>
+        </p:spPr>
+        <p:style>
+          <a:lnRef idx="1">
+            <a:schemeClr val="accent1"/>
+          </a:lnRef>
+          <a:fillRef idx="0">
+            <a:schemeClr val="accent1"/>
+          </a:fillRef>
+          <a:effectRef idx="0">
+            <a:schemeClr val="accent1"/>
+          </a:effectRef>
+          <a:fontRef idx="minor">
+            <a:schemeClr val="tx1"/>
+          </a:fontRef>
+        </p:style>
+      </p:cxnSp>
+      <p:sp>
+        <p:nvSpPr>
+          <p:cNvPr id="48" name="TextBox 47"/>
+          <p:cNvSpPr txBox="1"/>
+          <p:nvPr/>
+        </p:nvSpPr>
+        <p:spPr>
+          <a:xfrm>
+            <a:off x="1399721" y="3165565"/>
+            <a:ext cx="734432" cy="369332"/>
+          </a:xfrm>
+          <a:prstGeom prst="rect">
+            <a:avLst/>
+          </a:prstGeom>
+          <a:noFill/>
+        </p:spPr>
+        <p:txBody>
+          <a:bodyPr wrap="none" rtlCol="0">
+            <a:spAutoFit/>
+          </a:bodyPr>
+          <a:lstStyle/>
+          <a:p>
+            <a:r>
+              <a:rPr lang="en-US" altLang="ko-KR" dirty="0" smtClean="0">
+                <a:solidFill>
+                  <a:srgbClr val="FF0000"/>
+                </a:solidFill>
+              </a:rPr>
+              <a:t>HTTP</a:t>
+            </a:r>
+            <a:endParaRPr lang="ko-KR" altLang="en-US" dirty="0">
+              <a:solidFill>
+                <a:srgbClr val="FF0000"/>
+              </a:solidFill>
+            </a:endParaRPr>
+          </a:p>
+        </p:txBody>
+      </p:sp>
+      <p:sp>
+        <p:nvSpPr>
+          <p:cNvPr id="49" name="TextBox 48"/>
+          <p:cNvSpPr txBox="1"/>
+          <p:nvPr/>
+        </p:nvSpPr>
+        <p:spPr>
+          <a:xfrm>
+            <a:off x="5361568" y="3165565"/>
+            <a:ext cx="553357" cy="369332"/>
+          </a:xfrm>
+          <a:prstGeom prst="rect">
+            <a:avLst/>
+          </a:prstGeom>
+          <a:noFill/>
+        </p:spPr>
+        <p:txBody>
+          <a:bodyPr wrap="none" rtlCol="0">
+            <a:spAutoFit/>
+          </a:bodyPr>
+          <a:lstStyle/>
+          <a:p>
+            <a:r>
+              <a:rPr lang="en-US" altLang="ko-KR" dirty="0" smtClean="0">
+                <a:solidFill>
+                  <a:srgbClr val="FF0000"/>
+                </a:solidFill>
+              </a:rPr>
+              <a:t>SSE</a:t>
+            </a:r>
+            <a:endParaRPr lang="ko-KR" altLang="en-US" dirty="0">
+              <a:solidFill>
+                <a:srgbClr val="FF0000"/>
+              </a:solidFill>
+            </a:endParaRPr>
+          </a:p>
+        </p:txBody>
+      </p:sp>
+      <p:sp>
+        <p:nvSpPr>
+          <p:cNvPr id="50" name="TextBox 49"/>
+          <p:cNvSpPr txBox="1"/>
+          <p:nvPr/>
+        </p:nvSpPr>
+        <p:spPr>
+          <a:xfrm>
+            <a:off x="9272544" y="3114489"/>
+            <a:ext cx="1012265" cy="369332"/>
+          </a:xfrm>
+          <a:prstGeom prst="rect">
+            <a:avLst/>
+          </a:prstGeom>
+          <a:noFill/>
+        </p:spPr>
+        <p:txBody>
+          <a:bodyPr wrap="none" rtlCol="0">
+            <a:spAutoFit/>
+          </a:bodyPr>
+          <a:lstStyle/>
+          <a:p>
+            <a:r>
+              <a:rPr lang="en-US" altLang="ko-KR" dirty="0" smtClean="0">
+                <a:solidFill>
+                  <a:srgbClr val="FF0000"/>
+                </a:solidFill>
+              </a:rPr>
+              <a:t>SOCKET</a:t>
+            </a:r>
+            <a:endParaRPr lang="ko-KR" altLang="en-US" dirty="0">
+              <a:solidFill>
+                <a:srgbClr val="FF0000"/>
+              </a:solidFill>
+            </a:endParaRPr>
+          </a:p>
+        </p:txBody>
+      </p:sp>
+    </p:spTree>
+    <p:extLst>
+      <p:ext uri="{BB962C8B-B14F-4D97-AF65-F5344CB8AC3E}">
+        <p14:creationId xmlns:p14="http://schemas.microsoft.com/office/powerpoint/2010/main" val="2795850470"/>
+      </p:ext>
+    </p:extLst>
+  </p:cSld>
+  <p:clrMapOvr>
+    <a:masterClrMapping/>
+  </p:clrMapOvr>
+</p:sld>
+</file>
+
+<file path=ppt/slides/slide9.xml><?xml version="1.0" encoding="utf-8"?>
+<p:sld xmlns:a="http://schemas.openxmlformats.org/drawingml/2006/main" xmlns:r="http://schemas.openxmlformats.org/officeDocument/2006/relationships" xmlns:p="http://schemas.openxmlformats.org/presentationml/2006/main">
+  <p:cSld>
+    <p:spTree>
+      <p:nvGrpSpPr>
+        <p:cNvPr id="1" name=""/>
+        <p:cNvGrpSpPr/>
+        <p:nvPr/>
+      </p:nvGrpSpPr>
+      <p:grpSpPr>
+        <a:xfrm>
+          <a:off x="0" y="0"/>
+          <a:ext cx="0" cy="0"/>
+          <a:chOff x="0" y="0"/>
+          <a:chExt cx="0" cy="0"/>
+        </a:xfrm>
+      </p:grpSpPr>
+      <p:sp>
+        <p:nvSpPr>
+          <p:cNvPr id="4" name="TextBox 3"/>
+          <p:cNvSpPr txBox="1"/>
+          <p:nvPr/>
+        </p:nvSpPr>
+        <p:spPr>
+          <a:xfrm>
+            <a:off x="782515" y="474785"/>
+            <a:ext cx="8834470" cy="646331"/>
+          </a:xfrm>
+          <a:prstGeom prst="rect">
+            <a:avLst/>
+          </a:prstGeom>
+          <a:noFill/>
+        </p:spPr>
+        <p:txBody>
+          <a:bodyPr wrap="none" rtlCol="0">
+            <a:spAutoFit/>
+          </a:bodyPr>
+          <a:lstStyle/>
+          <a:p>
+            <a:r>
+              <a:rPr lang="en-US" altLang="ko-KR" dirty="0" smtClean="0"/>
+              <a:t>SSE </a:t>
+            </a:r>
+            <a:r>
+              <a:rPr lang="ko-KR" altLang="en-US" dirty="0" smtClean="0"/>
+              <a:t>채택 이유</a:t>
+            </a:r>
+            <a:endParaRPr lang="en-US" altLang="ko-KR" dirty="0" smtClean="0"/>
+          </a:p>
+          <a:p>
+            <a:r>
+              <a:rPr lang="ko-KR" altLang="en-US" dirty="0" smtClean="0"/>
+              <a:t>서버는 클라이언트에게 </a:t>
+            </a:r>
+            <a:r>
+              <a:rPr lang="ko-KR" altLang="en-US" dirty="0" err="1" smtClean="0"/>
+              <a:t>단방향</a:t>
+            </a:r>
+            <a:r>
+              <a:rPr lang="en-US" altLang="ko-KR" dirty="0" smtClean="0"/>
+              <a:t>/</a:t>
+            </a:r>
+            <a:r>
+              <a:rPr lang="ko-KR" altLang="en-US" dirty="0" smtClean="0"/>
+              <a:t>일회성 </a:t>
+            </a:r>
+            <a:r>
+              <a:rPr lang="ko-KR" altLang="en-US" dirty="0" err="1" smtClean="0"/>
+              <a:t>알림만을</a:t>
+            </a:r>
+            <a:r>
+              <a:rPr lang="ko-KR" altLang="en-US" dirty="0" smtClean="0"/>
+              <a:t> 보내므로 </a:t>
+            </a:r>
+            <a:r>
+              <a:rPr lang="en-US" altLang="ko-KR" dirty="0" smtClean="0"/>
+              <a:t>SSE</a:t>
+            </a:r>
+            <a:r>
+              <a:rPr lang="ko-KR" altLang="en-US" dirty="0" smtClean="0"/>
+              <a:t>를 사용하는게 가벼움</a:t>
+            </a:r>
+            <a:endParaRPr lang="ko-KR" altLang="en-US" dirty="0"/>
+          </a:p>
+        </p:txBody>
+      </p:sp>
+      <p:sp>
+        <p:nvSpPr>
+          <p:cNvPr id="5" name="TextBox 4"/>
+          <p:cNvSpPr txBox="1"/>
+          <p:nvPr/>
+        </p:nvSpPr>
+        <p:spPr>
+          <a:xfrm>
+            <a:off x="1099038" y="2031023"/>
+            <a:ext cx="3958071" cy="369332"/>
+          </a:xfrm>
+          <a:prstGeom prst="rect">
+            <a:avLst/>
+          </a:prstGeom>
+          <a:noFill/>
+        </p:spPr>
+        <p:txBody>
+          <a:bodyPr wrap="none" rtlCol="0">
+            <a:spAutoFit/>
+          </a:bodyPr>
+          <a:lstStyle/>
+          <a:p>
+            <a:r>
+              <a:rPr lang="en-US" altLang="ko-KR" dirty="0" smtClean="0"/>
+              <a:t>reconnection timeout default 30000</a:t>
+            </a:r>
+            <a:endParaRPr lang="ko-KR" altLang="en-US" dirty="0"/>
+          </a:p>
+        </p:txBody>
+      </p:sp>
+    </p:spTree>
+    <p:extLst>
+      <p:ext uri="{BB962C8B-B14F-4D97-AF65-F5344CB8AC3E}">
+        <p14:creationId xmlns:p14="http://schemas.microsoft.com/office/powerpoint/2010/main" val="562353"/>
+      </p:ext>
+    </p:extLst>
+  </p:cSld>
+  <p:clrMapOvr>
+    <a:masterClrMapping/>
+  </p:clrMapOvr>
+</p:sld>
+</file>
+
 <file path=ppt/theme/theme1.xml><?xml version="1.0" encoding="utf-8"?>
 <a:theme xmlns:a="http://schemas.openxmlformats.org/drawingml/2006/main" name="Office 테마">
   <a:themeElements>

</xml_diff>